<commit_message>
delete pycache files, restructure dataset path, generate cleaned csv file, update presentation
</commit_message>
<xml_diff>
--- a/presentation/Presentation.pptx
+++ b/presentation/Presentation.pptx
@@ -16,6 +16,7 @@
     <p:sldId id="262" r:id="rId10"/>
     <p:sldId id="261" r:id="rId11"/>
     <p:sldId id="265" r:id="rId12"/>
+    <p:sldId id="269" r:id="rId13"/>
   </p:sldIdLst>
   <p:sldSz cx="12192000" cy="6858000"/>
   <p:notesSz cx="6858000" cy="9144000"/>
@@ -11473,6 +11474,666 @@
     <p:extLst>
       <p:ext uri="{BB962C8B-B14F-4D97-AF65-F5344CB8AC3E}">
         <p14:creationId xmlns:p14="http://schemas.microsoft.com/office/powerpoint/2010/main" val="3853963368"/>
+      </p:ext>
+    </p:extLst>
+  </p:cSld>
+  <p:clrMapOvr>
+    <a:masterClrMapping/>
+  </p:clrMapOvr>
+</p:sld>
+</file>
+
+<file path=ppt/slides/slide12.xml><?xml version="1.0" encoding="utf-8"?>
+<p:sld xmlns:a="http://schemas.openxmlformats.org/drawingml/2006/main" xmlns:r="http://schemas.openxmlformats.org/officeDocument/2006/relationships" xmlns:p="http://schemas.openxmlformats.org/presentationml/2006/main">
+  <p:cSld>
+    <p:bg>
+      <p:bgPr>
+        <a:solidFill>
+          <a:schemeClr val="bg1"/>
+        </a:solidFill>
+        <a:effectLst/>
+      </p:bgPr>
+    </p:bg>
+    <p:spTree>
+      <p:nvGrpSpPr>
+        <p:cNvPr id="1" name=""/>
+        <p:cNvGrpSpPr/>
+        <p:nvPr/>
+      </p:nvGrpSpPr>
+      <p:grpSpPr>
+        <a:xfrm>
+          <a:off x="0" y="0"/>
+          <a:ext cx="0" cy="0"/>
+          <a:chOff x="0" y="0"/>
+          <a:chExt cx="0" cy="0"/>
+        </a:xfrm>
+      </p:grpSpPr>
+      <p:sp useBgFill="1">
+        <p:nvSpPr>
+          <p:cNvPr id="8" name="Rectangle 7">
+            <a:extLst>
+              <a:ext uri="{FF2B5EF4-FFF2-40B4-BE49-F238E27FC236}">
+                <a16:creationId xmlns:a16="http://schemas.microsoft.com/office/drawing/2014/main" id="{33CD251C-A887-4D2F-925B-FC097198538B}"/>
+              </a:ext>
+              <a:ext uri="{C183D7F6-B498-43B3-948B-1728B52AA6E4}">
+                <adec:decorative xmlns:adec="http://schemas.microsoft.com/office/drawing/2017/decorative" val="1"/>
+              </a:ext>
+            </a:extLst>
+          </p:cNvPr>
+          <p:cNvSpPr>
+            <a:spLocks noGrp="1" noRot="1" noChangeAspect="1" noMove="1" noResize="1" noEditPoints="1" noAdjustHandles="1" noChangeArrowheads="1" noChangeShapeType="1" noTextEdit="1"/>
+          </p:cNvSpPr>
+          <p:nvPr>
+            <p:extLst>
+              <p:ext uri="{386F3935-93C4-4BCD-93E2-E3B085C9AB24}">
+                <p16:designElem xmlns:p16="http://schemas.microsoft.com/office/powerpoint/2015/main" val="1"/>
+              </p:ext>
+            </p:extLst>
+          </p:nvPr>
+        </p:nvSpPr>
+        <p:spPr>
+          <a:xfrm>
+            <a:off x="0" y="0"/>
+            <a:ext cx="12192000" cy="6858000"/>
+          </a:xfrm>
+          <a:prstGeom prst="rect">
+            <a:avLst/>
+          </a:prstGeom>
+          <a:ln>
+            <a:noFill/>
+          </a:ln>
+        </p:spPr>
+        <p:style>
+          <a:lnRef idx="2">
+            <a:schemeClr val="accent1">
+              <a:shade val="50000"/>
+            </a:schemeClr>
+          </a:lnRef>
+          <a:fillRef idx="1">
+            <a:schemeClr val="accent1"/>
+          </a:fillRef>
+          <a:effectRef idx="0">
+            <a:schemeClr val="accent1"/>
+          </a:effectRef>
+          <a:fontRef idx="minor">
+            <a:schemeClr val="lt1"/>
+          </a:fontRef>
+        </p:style>
+        <p:txBody>
+          <a:bodyPr rtlCol="0" anchor="ctr"/>
+          <a:lstStyle/>
+          <a:p>
+            <a:pPr algn="ctr"/>
+            <a:endParaRPr lang="en-US"/>
+          </a:p>
+        </p:txBody>
+      </p:sp>
+      <p:sp>
+        <p:nvSpPr>
+          <p:cNvPr id="10" name="Rectangle 9">
+            <a:extLst>
+              <a:ext uri="{FF2B5EF4-FFF2-40B4-BE49-F238E27FC236}">
+                <a16:creationId xmlns:a16="http://schemas.microsoft.com/office/drawing/2014/main" id="{B19D093C-27FB-4032-B282-42C4563F257C}"/>
+              </a:ext>
+              <a:ext uri="{C183D7F6-B498-43B3-948B-1728B52AA6E4}">
+                <adec:decorative xmlns:adec="http://schemas.microsoft.com/office/drawing/2017/decorative" val="1"/>
+              </a:ext>
+            </a:extLst>
+          </p:cNvPr>
+          <p:cNvSpPr>
+            <a:spLocks noGrp="1" noRot="1" noChangeAspect="1" noMove="1" noResize="1" noEditPoints="1" noAdjustHandles="1" noChangeArrowheads="1" noChangeShapeType="1" noTextEdit="1"/>
+          </p:cNvSpPr>
+          <p:nvPr>
+            <p:extLst>
+              <p:ext uri="{386F3935-93C4-4BCD-93E2-E3B085C9AB24}">
+                <p16:designElem xmlns:p16="http://schemas.microsoft.com/office/powerpoint/2015/main" val="1"/>
+              </p:ext>
+            </p:extLst>
+          </p:nvPr>
+        </p:nvSpPr>
+        <p:spPr>
+          <a:xfrm>
+            <a:off x="0" y="0"/>
+            <a:ext cx="4694548" cy="6858000"/>
+          </a:xfrm>
+          <a:prstGeom prst="rect">
+            <a:avLst/>
+          </a:prstGeom>
+          <a:solidFill>
+            <a:schemeClr val="tx1"/>
+          </a:solidFill>
+          <a:ln>
+            <a:noFill/>
+          </a:ln>
+        </p:spPr>
+        <p:style>
+          <a:lnRef idx="2">
+            <a:schemeClr val="accent1">
+              <a:shade val="50000"/>
+            </a:schemeClr>
+          </a:lnRef>
+          <a:fillRef idx="1">
+            <a:schemeClr val="accent1"/>
+          </a:fillRef>
+          <a:effectRef idx="0">
+            <a:schemeClr val="accent1"/>
+          </a:effectRef>
+          <a:fontRef idx="minor">
+            <a:schemeClr val="lt1"/>
+          </a:fontRef>
+        </p:style>
+        <p:txBody>
+          <a:bodyPr rtlCol="0" anchor="ctr"/>
+          <a:lstStyle/>
+          <a:p>
+            <a:pPr algn="ctr"/>
+            <a:endParaRPr lang="en-US"/>
+          </a:p>
+        </p:txBody>
+      </p:sp>
+      <p:grpSp>
+        <p:nvGrpSpPr>
+          <p:cNvPr id="12" name="Group 11">
+            <a:extLst>
+              <a:ext uri="{FF2B5EF4-FFF2-40B4-BE49-F238E27FC236}">
+                <a16:creationId xmlns:a16="http://schemas.microsoft.com/office/drawing/2014/main" id="{35EE815E-1BD3-4777-B652-6D98825BF66B}"/>
+              </a:ext>
+              <a:ext uri="{C183D7F6-B498-43B3-948B-1728B52AA6E4}">
+                <adec:decorative xmlns:adec="http://schemas.microsoft.com/office/drawing/2017/decorative" val="1"/>
+              </a:ext>
+            </a:extLst>
+          </p:cNvPr>
+          <p:cNvGrpSpPr>
+            <a:grpSpLocks noGrp="1" noUngrp="1" noRot="1" noChangeAspect="1" noMove="1" noResize="1"/>
+          </p:cNvGrpSpPr>
+          <p:nvPr>
+            <p:extLst>
+              <p:ext uri="{386F3935-93C4-4BCD-93E2-E3B085C9AB24}">
+                <p16:designElem xmlns:p16="http://schemas.microsoft.com/office/powerpoint/2015/main" val="1"/>
+              </p:ext>
+            </p:extLst>
+          </p:nvPr>
+        </p:nvGrpSpPr>
+        <p:grpSpPr>
+          <a:xfrm>
+            <a:off x="767290" y="681628"/>
+            <a:ext cx="1128382" cy="847206"/>
+            <a:chOff x="668003" y="1684057"/>
+            <a:chExt cx="1128382" cy="847206"/>
+          </a:xfrm>
+        </p:grpSpPr>
+        <p:sp>
+          <p:nvSpPr>
+            <p:cNvPr id="13" name="Freeform 5">
+              <a:extLst>
+                <a:ext uri="{FF2B5EF4-FFF2-40B4-BE49-F238E27FC236}">
+                  <a16:creationId xmlns:a16="http://schemas.microsoft.com/office/drawing/2014/main" id="{E6692982-4A7D-4392-87CD-F0CD4B027DDE}"/>
+                </a:ext>
+                <a:ext uri="{C183D7F6-B498-43B3-948B-1728B52AA6E4}">
+                  <adec:decorative xmlns:adec="http://schemas.microsoft.com/office/drawing/2017/decorative" val="1"/>
+                </a:ext>
+              </a:extLst>
+            </p:cNvPr>
+            <p:cNvSpPr>
+              <a:spLocks/>
+            </p:cNvSpPr>
+            <p:nvPr>
+              <p:extLst>
+                <p:ext uri="{386F3935-93C4-4BCD-93E2-E3B085C9AB24}">
+                  <p16:designElem xmlns:p16="http://schemas.microsoft.com/office/powerpoint/2015/main" val="1"/>
+                </p:ext>
+              </p:extLst>
+            </p:nvPr>
+          </p:nvSpPr>
+          <p:spPr bwMode="auto">
+            <a:xfrm>
+              <a:off x="668003" y="1935883"/>
+              <a:ext cx="675351" cy="595380"/>
+            </a:xfrm>
+            <a:custGeom>
+              <a:avLst/>
+              <a:gdLst>
+                <a:gd name="T0" fmla="*/ 225 w 785"/>
+                <a:gd name="T1" fmla="*/ 692 h 692"/>
+                <a:gd name="T2" fmla="*/ 177 w 785"/>
+                <a:gd name="T3" fmla="*/ 665 h 692"/>
+                <a:gd name="T4" fmla="*/ 9 w 785"/>
+                <a:gd name="T5" fmla="*/ 374 h 692"/>
+                <a:gd name="T6" fmla="*/ 9 w 785"/>
+                <a:gd name="T7" fmla="*/ 318 h 692"/>
+                <a:gd name="T8" fmla="*/ 177 w 785"/>
+                <a:gd name="T9" fmla="*/ 27 h 692"/>
+                <a:gd name="T10" fmla="*/ 225 w 785"/>
+                <a:gd name="T11" fmla="*/ 0 h 692"/>
+                <a:gd name="T12" fmla="*/ 561 w 785"/>
+                <a:gd name="T13" fmla="*/ 0 h 692"/>
+                <a:gd name="T14" fmla="*/ 609 w 785"/>
+                <a:gd name="T15" fmla="*/ 27 h 692"/>
+                <a:gd name="T16" fmla="*/ 777 w 785"/>
+                <a:gd name="T17" fmla="*/ 318 h 692"/>
+                <a:gd name="T18" fmla="*/ 777 w 785"/>
+                <a:gd name="T19" fmla="*/ 374 h 692"/>
+                <a:gd name="T20" fmla="*/ 609 w 785"/>
+                <a:gd name="T21" fmla="*/ 665 h 692"/>
+                <a:gd name="T22" fmla="*/ 561 w 785"/>
+                <a:gd name="T23" fmla="*/ 692 h 692"/>
+                <a:gd name="T24" fmla="*/ 225 w 785"/>
+                <a:gd name="T25" fmla="*/ 692 h 692"/>
+              </a:gdLst>
+              <a:ahLst/>
+              <a:cxnLst>
+                <a:cxn ang="0">
+                  <a:pos x="T0" y="T1"/>
+                </a:cxn>
+                <a:cxn ang="0">
+                  <a:pos x="T2" y="T3"/>
+                </a:cxn>
+                <a:cxn ang="0">
+                  <a:pos x="T4" y="T5"/>
+                </a:cxn>
+                <a:cxn ang="0">
+                  <a:pos x="T6" y="T7"/>
+                </a:cxn>
+                <a:cxn ang="0">
+                  <a:pos x="T8" y="T9"/>
+                </a:cxn>
+                <a:cxn ang="0">
+                  <a:pos x="T10" y="T11"/>
+                </a:cxn>
+                <a:cxn ang="0">
+                  <a:pos x="T12" y="T13"/>
+                </a:cxn>
+                <a:cxn ang="0">
+                  <a:pos x="T14" y="T15"/>
+                </a:cxn>
+                <a:cxn ang="0">
+                  <a:pos x="T16" y="T17"/>
+                </a:cxn>
+                <a:cxn ang="0">
+                  <a:pos x="T18" y="T19"/>
+                </a:cxn>
+                <a:cxn ang="0">
+                  <a:pos x="T20" y="T21"/>
+                </a:cxn>
+                <a:cxn ang="0">
+                  <a:pos x="T22" y="T23"/>
+                </a:cxn>
+                <a:cxn ang="0">
+                  <a:pos x="T24" y="T25"/>
+                </a:cxn>
+              </a:cxnLst>
+              <a:rect l="0" t="0" r="r" b="b"/>
+              <a:pathLst>
+                <a:path w="785" h="692">
+                  <a:moveTo>
+                    <a:pt x="225" y="692"/>
+                  </a:moveTo>
+                  <a:cubicBezTo>
+                    <a:pt x="207" y="692"/>
+                    <a:pt x="185" y="680"/>
+                    <a:pt x="177" y="665"/>
+                  </a:cubicBezTo>
+                  <a:cubicBezTo>
+                    <a:pt x="9" y="374"/>
+                    <a:pt x="9" y="374"/>
+                    <a:pt x="9" y="374"/>
+                  </a:cubicBezTo>
+                  <a:cubicBezTo>
+                    <a:pt x="0" y="358"/>
+                    <a:pt x="0" y="334"/>
+                    <a:pt x="9" y="318"/>
+                  </a:cubicBezTo>
+                  <a:cubicBezTo>
+                    <a:pt x="177" y="27"/>
+                    <a:pt x="177" y="27"/>
+                    <a:pt x="177" y="27"/>
+                  </a:cubicBezTo>
+                  <a:cubicBezTo>
+                    <a:pt x="185" y="12"/>
+                    <a:pt x="207" y="0"/>
+                    <a:pt x="225" y="0"/>
+                  </a:cubicBezTo>
+                  <a:cubicBezTo>
+                    <a:pt x="561" y="0"/>
+                    <a:pt x="561" y="0"/>
+                    <a:pt x="561" y="0"/>
+                  </a:cubicBezTo>
+                  <a:cubicBezTo>
+                    <a:pt x="578" y="0"/>
+                    <a:pt x="600" y="12"/>
+                    <a:pt x="609" y="27"/>
+                  </a:cubicBezTo>
+                  <a:cubicBezTo>
+                    <a:pt x="777" y="318"/>
+                    <a:pt x="777" y="318"/>
+                    <a:pt x="777" y="318"/>
+                  </a:cubicBezTo>
+                  <a:cubicBezTo>
+                    <a:pt x="785" y="334"/>
+                    <a:pt x="785" y="358"/>
+                    <a:pt x="777" y="374"/>
+                  </a:cubicBezTo>
+                  <a:cubicBezTo>
+                    <a:pt x="609" y="665"/>
+                    <a:pt x="609" y="665"/>
+                    <a:pt x="609" y="665"/>
+                  </a:cubicBezTo>
+                  <a:cubicBezTo>
+                    <a:pt x="600" y="680"/>
+                    <a:pt x="578" y="692"/>
+                    <a:pt x="561" y="692"/>
+                  </a:cubicBezTo>
+                  <a:lnTo>
+                    <a:pt x="225" y="692"/>
+                  </a:lnTo>
+                  <a:close/>
+                </a:path>
+              </a:pathLst>
+            </a:custGeom>
+            <a:noFill/>
+            <a:ln w="28575" cmpd="sng">
+              <a:solidFill>
+                <a:schemeClr val="bg1"/>
+              </a:solidFill>
+            </a:ln>
+          </p:spPr>
+          <p:txBody>
+            <a:bodyPr vert="horz" wrap="square" lIns="91440" tIns="45720" rIns="91440" bIns="45720" numCol="1" anchor="t" anchorCtr="0" compatLnSpc="1">
+              <a:prstTxWarp prst="textNoShape">
+                <a:avLst/>
+              </a:prstTxWarp>
+            </a:bodyPr>
+            <a:lstStyle/>
+            <a:p>
+              <a:endParaRPr lang="en-US"/>
+            </a:p>
+          </p:txBody>
+        </p:sp>
+        <p:sp>
+          <p:nvSpPr>
+            <p:cNvPr id="14" name="Freeform 5">
+              <a:extLst>
+                <a:ext uri="{FF2B5EF4-FFF2-40B4-BE49-F238E27FC236}">
+                  <a16:creationId xmlns:a16="http://schemas.microsoft.com/office/drawing/2014/main" id="{196485F7-F277-4123-AC53-98EA4C858774}"/>
+                </a:ext>
+                <a:ext uri="{C183D7F6-B498-43B3-948B-1728B52AA6E4}">
+                  <adec:decorative xmlns:adec="http://schemas.microsoft.com/office/drawing/2017/decorative" val="1"/>
+                </a:ext>
+              </a:extLst>
+            </p:cNvPr>
+            <p:cNvSpPr>
+              <a:spLocks/>
+            </p:cNvSpPr>
+            <p:nvPr>
+              <p:extLst>
+                <p:ext uri="{386F3935-93C4-4BCD-93E2-E3B085C9AB24}">
+                  <p16:designElem xmlns:p16="http://schemas.microsoft.com/office/powerpoint/2015/main" val="1"/>
+                </p:ext>
+              </p:extLst>
+            </p:nvPr>
+          </p:nvSpPr>
+          <p:spPr bwMode="auto">
+            <a:xfrm>
+              <a:off x="1245893" y="1684057"/>
+              <a:ext cx="550492" cy="485306"/>
+            </a:xfrm>
+            <a:custGeom>
+              <a:avLst/>
+              <a:gdLst>
+                <a:gd name="T0" fmla="*/ 225 w 785"/>
+                <a:gd name="T1" fmla="*/ 692 h 692"/>
+                <a:gd name="T2" fmla="*/ 177 w 785"/>
+                <a:gd name="T3" fmla="*/ 665 h 692"/>
+                <a:gd name="T4" fmla="*/ 9 w 785"/>
+                <a:gd name="T5" fmla="*/ 374 h 692"/>
+                <a:gd name="T6" fmla="*/ 9 w 785"/>
+                <a:gd name="T7" fmla="*/ 318 h 692"/>
+                <a:gd name="T8" fmla="*/ 177 w 785"/>
+                <a:gd name="T9" fmla="*/ 27 h 692"/>
+                <a:gd name="T10" fmla="*/ 225 w 785"/>
+                <a:gd name="T11" fmla="*/ 0 h 692"/>
+                <a:gd name="T12" fmla="*/ 561 w 785"/>
+                <a:gd name="T13" fmla="*/ 0 h 692"/>
+                <a:gd name="T14" fmla="*/ 609 w 785"/>
+                <a:gd name="T15" fmla="*/ 27 h 692"/>
+                <a:gd name="T16" fmla="*/ 777 w 785"/>
+                <a:gd name="T17" fmla="*/ 318 h 692"/>
+                <a:gd name="T18" fmla="*/ 777 w 785"/>
+                <a:gd name="T19" fmla="*/ 374 h 692"/>
+                <a:gd name="T20" fmla="*/ 609 w 785"/>
+                <a:gd name="T21" fmla="*/ 665 h 692"/>
+                <a:gd name="T22" fmla="*/ 561 w 785"/>
+                <a:gd name="T23" fmla="*/ 692 h 692"/>
+                <a:gd name="T24" fmla="*/ 225 w 785"/>
+                <a:gd name="T25" fmla="*/ 692 h 692"/>
+              </a:gdLst>
+              <a:ahLst/>
+              <a:cxnLst>
+                <a:cxn ang="0">
+                  <a:pos x="T0" y="T1"/>
+                </a:cxn>
+                <a:cxn ang="0">
+                  <a:pos x="T2" y="T3"/>
+                </a:cxn>
+                <a:cxn ang="0">
+                  <a:pos x="T4" y="T5"/>
+                </a:cxn>
+                <a:cxn ang="0">
+                  <a:pos x="T6" y="T7"/>
+                </a:cxn>
+                <a:cxn ang="0">
+                  <a:pos x="T8" y="T9"/>
+                </a:cxn>
+                <a:cxn ang="0">
+                  <a:pos x="T10" y="T11"/>
+                </a:cxn>
+                <a:cxn ang="0">
+                  <a:pos x="T12" y="T13"/>
+                </a:cxn>
+                <a:cxn ang="0">
+                  <a:pos x="T14" y="T15"/>
+                </a:cxn>
+                <a:cxn ang="0">
+                  <a:pos x="T16" y="T17"/>
+                </a:cxn>
+                <a:cxn ang="0">
+                  <a:pos x="T18" y="T19"/>
+                </a:cxn>
+                <a:cxn ang="0">
+                  <a:pos x="T20" y="T21"/>
+                </a:cxn>
+                <a:cxn ang="0">
+                  <a:pos x="T22" y="T23"/>
+                </a:cxn>
+                <a:cxn ang="0">
+                  <a:pos x="T24" y="T25"/>
+                </a:cxn>
+              </a:cxnLst>
+              <a:rect l="0" t="0" r="r" b="b"/>
+              <a:pathLst>
+                <a:path w="785" h="692">
+                  <a:moveTo>
+                    <a:pt x="225" y="692"/>
+                  </a:moveTo>
+                  <a:cubicBezTo>
+                    <a:pt x="207" y="692"/>
+                    <a:pt x="185" y="680"/>
+                    <a:pt x="177" y="665"/>
+                  </a:cubicBezTo>
+                  <a:cubicBezTo>
+                    <a:pt x="9" y="374"/>
+                    <a:pt x="9" y="374"/>
+                    <a:pt x="9" y="374"/>
+                  </a:cubicBezTo>
+                  <a:cubicBezTo>
+                    <a:pt x="0" y="358"/>
+                    <a:pt x="0" y="334"/>
+                    <a:pt x="9" y="318"/>
+                  </a:cubicBezTo>
+                  <a:cubicBezTo>
+                    <a:pt x="177" y="27"/>
+                    <a:pt x="177" y="27"/>
+                    <a:pt x="177" y="27"/>
+                  </a:cubicBezTo>
+                  <a:cubicBezTo>
+                    <a:pt x="185" y="12"/>
+                    <a:pt x="207" y="0"/>
+                    <a:pt x="225" y="0"/>
+                  </a:cubicBezTo>
+                  <a:cubicBezTo>
+                    <a:pt x="561" y="0"/>
+                    <a:pt x="561" y="0"/>
+                    <a:pt x="561" y="0"/>
+                  </a:cubicBezTo>
+                  <a:cubicBezTo>
+                    <a:pt x="578" y="0"/>
+                    <a:pt x="600" y="12"/>
+                    <a:pt x="609" y="27"/>
+                  </a:cubicBezTo>
+                  <a:cubicBezTo>
+                    <a:pt x="777" y="318"/>
+                    <a:pt x="777" y="318"/>
+                    <a:pt x="777" y="318"/>
+                  </a:cubicBezTo>
+                  <a:cubicBezTo>
+                    <a:pt x="785" y="334"/>
+                    <a:pt x="785" y="358"/>
+                    <a:pt x="777" y="374"/>
+                  </a:cubicBezTo>
+                  <a:cubicBezTo>
+                    <a:pt x="609" y="665"/>
+                    <a:pt x="609" y="665"/>
+                    <a:pt x="609" y="665"/>
+                  </a:cubicBezTo>
+                  <a:cubicBezTo>
+                    <a:pt x="600" y="680"/>
+                    <a:pt x="578" y="692"/>
+                    <a:pt x="561" y="692"/>
+                  </a:cubicBezTo>
+                  <a:lnTo>
+                    <a:pt x="225" y="692"/>
+                  </a:lnTo>
+                  <a:close/>
+                </a:path>
+              </a:pathLst>
+            </a:custGeom>
+            <a:noFill/>
+            <a:ln w="28575" cmpd="sng">
+              <a:solidFill>
+                <a:schemeClr val="bg1"/>
+              </a:solidFill>
+            </a:ln>
+          </p:spPr>
+          <p:txBody>
+            <a:bodyPr vert="horz" wrap="square" lIns="91440" tIns="45720" rIns="91440" bIns="45720" numCol="1" anchor="t" anchorCtr="0" compatLnSpc="1">
+              <a:prstTxWarp prst="textNoShape">
+                <a:avLst/>
+              </a:prstTxWarp>
+            </a:bodyPr>
+            <a:lstStyle/>
+            <a:p>
+              <a:endParaRPr lang="en-US"/>
+            </a:p>
+          </p:txBody>
+        </p:sp>
+      </p:grpSp>
+      <p:sp>
+        <p:nvSpPr>
+          <p:cNvPr id="2" name="Title 1">
+            <a:extLst>
+              <a:ext uri="{FF2B5EF4-FFF2-40B4-BE49-F238E27FC236}">
+                <a16:creationId xmlns:a16="http://schemas.microsoft.com/office/drawing/2014/main" id="{72435E97-8E7A-4036-B16A-B49EF49B3DA6}"/>
+              </a:ext>
+            </a:extLst>
+          </p:cNvPr>
+          <p:cNvSpPr>
+            <a:spLocks noGrp="1"/>
+          </p:cNvSpPr>
+          <p:nvPr>
+            <p:ph type="title"/>
+          </p:nvPr>
+        </p:nvSpPr>
+        <p:spPr>
+          <a:xfrm>
+            <a:off x="767290" y="1166932"/>
+            <a:ext cx="3582073" cy="4279709"/>
+          </a:xfrm>
+        </p:spPr>
+        <p:txBody>
+          <a:bodyPr anchor="ctr">
+            <a:normAutofit/>
+          </a:bodyPr>
+          <a:lstStyle/>
+          <a:p>
+            <a:r>
+              <a:rPr lang="en-US" sz="4800" dirty="0">
+                <a:solidFill>
+                  <a:schemeClr val="bg1"/>
+                </a:solidFill>
+              </a:rPr>
+              <a:t>Text Vectorization</a:t>
+            </a:r>
+          </a:p>
+        </p:txBody>
+      </p:sp>
+      <p:sp>
+        <p:nvSpPr>
+          <p:cNvPr id="3" name="Content Placeholder 2">
+            <a:extLst>
+              <a:ext uri="{FF2B5EF4-FFF2-40B4-BE49-F238E27FC236}">
+                <a16:creationId xmlns:a16="http://schemas.microsoft.com/office/drawing/2014/main" id="{5BF9433E-798E-4A53-8B50-D157D7563D26}"/>
+              </a:ext>
+            </a:extLst>
+          </p:cNvPr>
+          <p:cNvSpPr>
+            <a:spLocks noGrp="1"/>
+          </p:cNvSpPr>
+          <p:nvPr>
+            <p:ph idx="1"/>
+          </p:nvPr>
+        </p:nvSpPr>
+        <p:spPr>
+          <a:xfrm>
+            <a:off x="5573864" y="1166933"/>
+            <a:ext cx="5716988" cy="4279709"/>
+          </a:xfrm>
+        </p:spPr>
+        <p:txBody>
+          <a:bodyPr anchor="ctr">
+            <a:normAutofit/>
+          </a:bodyPr>
+          <a:lstStyle/>
+          <a:p>
+            <a:r>
+              <a:rPr lang="en-US" sz="2400" dirty="0"/>
+              <a:t>Bag of words </a:t>
+            </a:r>
+          </a:p>
+          <a:p>
+            <a:r>
+              <a:rPr lang="en-US" sz="2400" dirty="0"/>
+              <a:t>Word2vec</a:t>
+            </a:r>
+          </a:p>
+          <a:p>
+            <a:r>
+              <a:rPr lang="en-US" sz="2400" dirty="0" err="1"/>
+              <a:t>TfidfVectorizer</a:t>
+            </a:r>
+            <a:endParaRPr lang="en-US" sz="2400" dirty="0"/>
+          </a:p>
+          <a:p>
+            <a:r>
+              <a:rPr lang="en-US" sz="2400" dirty="0"/>
+              <a:t>Skip-Thought Vectors</a:t>
+            </a:r>
+          </a:p>
+        </p:txBody>
+      </p:sp>
+    </p:spTree>
+    <p:extLst>
+      <p:ext uri="{BB962C8B-B14F-4D97-AF65-F5344CB8AC3E}">
+        <p14:creationId xmlns:p14="http://schemas.microsoft.com/office/powerpoint/2010/main" val="2013308458"/>
       </p:ext>
     </p:extLst>
   </p:cSld>

</xml_diff>

<commit_message>
regenerate machine learning models, impl tfidf
</commit_message>
<xml_diff>
--- a/presentation/Presentation.pptx
+++ b/presentation/Presentation.pptx
@@ -18,7 +18,8 @@
     <p:sldId id="261" r:id="rId12"/>
     <p:sldId id="265" r:id="rId13"/>
     <p:sldId id="269" r:id="rId14"/>
-    <p:sldId id="271" r:id="rId15"/>
+    <p:sldId id="272" r:id="rId15"/>
+    <p:sldId id="271" r:id="rId16"/>
   </p:sldIdLst>
   <p:sldSz cx="12192000" cy="6858000"/>
   <p:notesSz cx="6858000" cy="9144000"/>
@@ -7448,7 +7449,7 @@
           <a:p>
             <a:fld id="{2743EB9B-2488-4718-BE68-8707A217D453}" type="datetimeFigureOut">
               <a:rPr lang="en-US" smtClean="0"/>
-              <a:t>6/15/2021</a:t>
+              <a:t>6/20/2021</a:t>
             </a:fld>
             <a:endParaRPr lang="en-US"/>
           </a:p>
@@ -7646,7 +7647,7 @@
           <a:p>
             <a:fld id="{2743EB9B-2488-4718-BE68-8707A217D453}" type="datetimeFigureOut">
               <a:rPr lang="en-US" smtClean="0"/>
-              <a:t>6/15/2021</a:t>
+              <a:t>6/20/2021</a:t>
             </a:fld>
             <a:endParaRPr lang="en-US"/>
           </a:p>
@@ -7854,7 +7855,7 @@
           <a:p>
             <a:fld id="{2743EB9B-2488-4718-BE68-8707A217D453}" type="datetimeFigureOut">
               <a:rPr lang="en-US" smtClean="0"/>
-              <a:t>6/15/2021</a:t>
+              <a:t>6/20/2021</a:t>
             </a:fld>
             <a:endParaRPr lang="en-US"/>
           </a:p>
@@ -8052,7 +8053,7 @@
           <a:p>
             <a:fld id="{2743EB9B-2488-4718-BE68-8707A217D453}" type="datetimeFigureOut">
               <a:rPr lang="en-US" smtClean="0"/>
-              <a:t>6/15/2021</a:t>
+              <a:t>6/20/2021</a:t>
             </a:fld>
             <a:endParaRPr lang="en-US"/>
           </a:p>
@@ -8327,7 +8328,7 @@
           <a:p>
             <a:fld id="{2743EB9B-2488-4718-BE68-8707A217D453}" type="datetimeFigureOut">
               <a:rPr lang="en-US" smtClean="0"/>
-              <a:t>6/15/2021</a:t>
+              <a:t>6/20/2021</a:t>
             </a:fld>
             <a:endParaRPr lang="en-US"/>
           </a:p>
@@ -8592,7 +8593,7 @@
           <a:p>
             <a:fld id="{2743EB9B-2488-4718-BE68-8707A217D453}" type="datetimeFigureOut">
               <a:rPr lang="en-US" smtClean="0"/>
-              <a:t>6/15/2021</a:t>
+              <a:t>6/20/2021</a:t>
             </a:fld>
             <a:endParaRPr lang="en-US"/>
           </a:p>
@@ -9004,7 +9005,7 @@
           <a:p>
             <a:fld id="{2743EB9B-2488-4718-BE68-8707A217D453}" type="datetimeFigureOut">
               <a:rPr lang="en-US" smtClean="0"/>
-              <a:t>6/15/2021</a:t>
+              <a:t>6/20/2021</a:t>
             </a:fld>
             <a:endParaRPr lang="en-US"/>
           </a:p>
@@ -9145,7 +9146,7 @@
           <a:p>
             <a:fld id="{2743EB9B-2488-4718-BE68-8707A217D453}" type="datetimeFigureOut">
               <a:rPr lang="en-US" smtClean="0"/>
-              <a:t>6/15/2021</a:t>
+              <a:t>6/20/2021</a:t>
             </a:fld>
             <a:endParaRPr lang="en-US"/>
           </a:p>
@@ -9258,7 +9259,7 @@
           <a:p>
             <a:fld id="{2743EB9B-2488-4718-BE68-8707A217D453}" type="datetimeFigureOut">
               <a:rPr lang="en-US" smtClean="0"/>
-              <a:t>6/15/2021</a:t>
+              <a:t>6/20/2021</a:t>
             </a:fld>
             <a:endParaRPr lang="en-US"/>
           </a:p>
@@ -9569,7 +9570,7 @@
           <a:p>
             <a:fld id="{2743EB9B-2488-4718-BE68-8707A217D453}" type="datetimeFigureOut">
               <a:rPr lang="en-US" smtClean="0"/>
-              <a:t>6/15/2021</a:t>
+              <a:t>6/20/2021</a:t>
             </a:fld>
             <a:endParaRPr lang="en-US"/>
           </a:p>
@@ -9857,7 +9858,7 @@
           <a:p>
             <a:fld id="{2743EB9B-2488-4718-BE68-8707A217D453}" type="datetimeFigureOut">
               <a:rPr lang="en-US" smtClean="0"/>
-              <a:t>6/15/2021</a:t>
+              <a:t>6/20/2021</a:t>
             </a:fld>
             <a:endParaRPr lang="en-US"/>
           </a:p>
@@ -10098,7 +10099,7 @@
           <a:p>
             <a:fld id="{2743EB9B-2488-4718-BE68-8707A217D453}" type="datetimeFigureOut">
               <a:rPr lang="en-US" smtClean="0"/>
-              <a:t>6/15/2021</a:t>
+              <a:t>6/20/2021</a:t>
             </a:fld>
             <a:endParaRPr lang="en-US"/>
           </a:p>
@@ -13104,6 +13105,14 @@
 <file path=ppt/slides/slide12.xml><?xml version="1.0" encoding="utf-8"?>
 <p:sld xmlns:a="http://schemas.openxmlformats.org/drawingml/2006/main" xmlns:r="http://schemas.openxmlformats.org/officeDocument/2006/relationships" xmlns:p="http://schemas.openxmlformats.org/presentationml/2006/main">
   <p:cSld>
+    <p:bg>
+      <p:bgPr>
+        <a:solidFill>
+          <a:schemeClr val="bg1"/>
+        </a:solidFill>
+        <a:effectLst/>
+      </p:bgPr>
+    </p:bg>
     <p:spTree>
       <p:nvGrpSpPr>
         <p:cNvPr id="1" name=""/>
@@ -13120,6 +13129,72 @@
       </p:grpSpPr>
       <p:sp>
         <p:nvSpPr>
+          <p:cNvPr id="8" name="Rectangle 7">
+            <a:extLst>
+              <a:ext uri="{FF2B5EF4-FFF2-40B4-BE49-F238E27FC236}">
+                <a16:creationId xmlns:a16="http://schemas.microsoft.com/office/drawing/2014/main" id="{C3896A03-3945-419A-B66B-4EE266EDD152}"/>
+              </a:ext>
+              <a:ext uri="{C183D7F6-B498-43B3-948B-1728B52AA6E4}">
+                <adec:decorative xmlns:adec="http://schemas.microsoft.com/office/drawing/2017/decorative" val="1"/>
+              </a:ext>
+            </a:extLst>
+          </p:cNvPr>
+          <p:cNvSpPr>
+            <a:spLocks noGrp="1" noRot="1" noChangeAspect="1" noMove="1" noResize="1" noEditPoints="1" noAdjustHandles="1" noChangeArrowheads="1" noChangeShapeType="1" noTextEdit="1"/>
+          </p:cNvSpPr>
+          <p:nvPr>
+            <p:extLst>
+              <p:ext uri="{386F3935-93C4-4BCD-93E2-E3B085C9AB24}">
+                <p16:designElem xmlns:p16="http://schemas.microsoft.com/office/powerpoint/2015/main" val="1"/>
+              </p:ext>
+            </p:extLst>
+          </p:nvPr>
+        </p:nvSpPr>
+        <p:spPr>
+          <a:xfrm>
+            <a:off x="11" y="0"/>
+            <a:ext cx="4654286" cy="6858001"/>
+          </a:xfrm>
+          <a:prstGeom prst="rect">
+            <a:avLst/>
+          </a:prstGeom>
+          <a:solidFill>
+            <a:schemeClr val="tx1">
+              <a:lumMod val="85000"/>
+              <a:lumOff val="15000"/>
+            </a:schemeClr>
+          </a:solidFill>
+          <a:ln>
+            <a:noFill/>
+          </a:ln>
+        </p:spPr>
+        <p:style>
+          <a:lnRef idx="2">
+            <a:schemeClr val="accent1">
+              <a:shade val="50000"/>
+            </a:schemeClr>
+          </a:lnRef>
+          <a:fillRef idx="1">
+            <a:schemeClr val="accent1"/>
+          </a:fillRef>
+          <a:effectRef idx="0">
+            <a:schemeClr val="accent1"/>
+          </a:effectRef>
+          <a:fontRef idx="minor">
+            <a:schemeClr val="lt1"/>
+          </a:fontRef>
+        </p:style>
+        <p:txBody>
+          <a:bodyPr rtlCol="0" anchor="ctr"/>
+          <a:lstStyle/>
+          <a:p>
+            <a:pPr algn="ctr"/>
+            <a:endParaRPr lang="en-US"/>
+          </a:p>
+        </p:txBody>
+      </p:sp>
+      <p:sp>
+        <p:nvSpPr>
           <p:cNvPr id="2" name="Title 1">
             <a:extLst>
               <a:ext uri="{FF2B5EF4-FFF2-40B4-BE49-F238E27FC236}">
@@ -13134,15 +13209,94 @@
             <p:ph type="title"/>
           </p:nvPr>
         </p:nvSpPr>
-        <p:spPr/>
+        <p:spPr>
+          <a:xfrm>
+            <a:off x="1155559" y="637762"/>
+            <a:ext cx="2899568" cy="5576770"/>
+          </a:xfrm>
+        </p:spPr>
         <p:txBody>
-          <a:bodyPr/>
+          <a:bodyPr vert="horz" lIns="91440" tIns="45720" rIns="91440" bIns="45720" rtlCol="0" anchor="ctr">
+            <a:normAutofit/>
+          </a:bodyPr>
           <a:lstStyle/>
           <a:p>
             <a:r>
-              <a:rPr lang="en-US" dirty="0"/>
+              <a:rPr lang="en-US" sz="4800" kern="1200">
+                <a:solidFill>
+                  <a:schemeClr val="bg1"/>
+                </a:solidFill>
+                <a:latin typeface="+mj-lt"/>
+                <a:ea typeface="+mj-ea"/>
+                <a:cs typeface="+mj-cs"/>
+              </a:rPr>
               <a:t>Dictionary</a:t>
             </a:r>
+          </a:p>
+        </p:txBody>
+      </p:sp>
+      <p:sp>
+        <p:nvSpPr>
+          <p:cNvPr id="10" name="Rectangle 9">
+            <a:extLst>
+              <a:ext uri="{FF2B5EF4-FFF2-40B4-BE49-F238E27FC236}">
+                <a16:creationId xmlns:a16="http://schemas.microsoft.com/office/drawing/2014/main" id="{B34F5AD2-EDBD-4BBD-A55C-EAFFD0C7097A}"/>
+              </a:ext>
+              <a:ext uri="{C183D7F6-B498-43B3-948B-1728B52AA6E4}">
+                <adec:decorative xmlns:adec="http://schemas.microsoft.com/office/drawing/2017/decorative" val="1"/>
+              </a:ext>
+            </a:extLst>
+          </p:cNvPr>
+          <p:cNvSpPr>
+            <a:spLocks noGrp="1" noRot="1" noChangeAspect="1" noMove="1" noResize="1" noEditPoints="1" noAdjustHandles="1" noChangeArrowheads="1" noChangeShapeType="1" noTextEdit="1"/>
+          </p:cNvSpPr>
+          <p:nvPr>
+            <p:extLst>
+              <p:ext uri="{386F3935-93C4-4BCD-93E2-E3B085C9AB24}">
+                <p16:designElem xmlns:p16="http://schemas.microsoft.com/office/powerpoint/2015/main" val="1"/>
+              </p:ext>
+            </p:extLst>
+          </p:nvPr>
+        </p:nvSpPr>
+        <p:spPr>
+          <a:xfrm>
+            <a:off x="4652535" y="0"/>
+            <a:ext cx="7539455" cy="6858001"/>
+          </a:xfrm>
+          <a:prstGeom prst="rect">
+            <a:avLst/>
+          </a:prstGeom>
+          <a:solidFill>
+            <a:schemeClr val="bg1">
+              <a:lumMod val="95000"/>
+            </a:schemeClr>
+          </a:solidFill>
+          <a:ln>
+            <a:noFill/>
+          </a:ln>
+        </p:spPr>
+        <p:style>
+          <a:lnRef idx="2">
+            <a:schemeClr val="accent1">
+              <a:shade val="50000"/>
+            </a:schemeClr>
+          </a:lnRef>
+          <a:fillRef idx="1">
+            <a:schemeClr val="accent1"/>
+          </a:fillRef>
+          <a:effectRef idx="0">
+            <a:schemeClr val="accent1"/>
+          </a:effectRef>
+          <a:fontRef idx="minor">
+            <a:schemeClr val="lt1"/>
+          </a:fontRef>
+        </p:style>
+        <p:txBody>
+          <a:bodyPr rtlCol="0" anchor="ctr"/>
+          <a:lstStyle/>
+          <a:p>
+            <a:pPr algn="ctr"/>
+            <a:endParaRPr lang="en-US"/>
           </a:p>
         </p:txBody>
       </p:sp>
@@ -13162,15 +13316,69 @@
             <p:ph idx="1"/>
           </p:nvPr>
         </p:nvSpPr>
-        <p:spPr/>
+        <p:spPr>
+          <a:xfrm>
+            <a:off x="5444775" y="637762"/>
+            <a:ext cx="5600580" cy="5576770"/>
+          </a:xfrm>
+        </p:spPr>
         <p:txBody>
-          <a:bodyPr/>
+          <a:bodyPr vert="horz" lIns="91440" tIns="45720" rIns="91440" bIns="45720" rtlCol="0" anchor="ctr">
+            <a:normAutofit/>
+          </a:bodyPr>
           <a:lstStyle/>
           <a:p>
+            <a:pPr marL="0" indent="0">
+              <a:buNone/>
+            </a:pPr>
             <a:r>
-              <a:rPr lang="en-US" dirty="0"/>
-              <a:t>TODO</a:t>
+              <a:rPr lang="en-US" sz="3200" dirty="0"/>
+              <a:t>Initial Size: 14.523</a:t>
             </a:r>
+          </a:p>
+          <a:p>
+            <a:pPr marL="0" indent="0">
+              <a:buNone/>
+            </a:pPr>
+            <a:endParaRPr lang="en-US" sz="3200" dirty="0"/>
+          </a:p>
+          <a:p>
+            <a:pPr marL="0" indent="0">
+              <a:buNone/>
+            </a:pPr>
+            <a:r>
+              <a:rPr lang="en-US" sz="3200" dirty="0"/>
+              <a:t>Remove 1</a:t>
+            </a:r>
+          </a:p>
+          <a:p>
+            <a:pPr marL="0" indent="0">
+              <a:buNone/>
+            </a:pPr>
+            <a:r>
+              <a:rPr lang="en-US" sz="3200" dirty="0"/>
+              <a:t>8470</a:t>
+            </a:r>
+          </a:p>
+          <a:p>
+            <a:endParaRPr lang="en-US" sz="3200" kern="1200" dirty="0">
+              <a:solidFill>
+                <a:schemeClr val="tx1"/>
+              </a:solidFill>
+              <a:latin typeface="+mn-lt"/>
+              <a:ea typeface="+mn-ea"/>
+              <a:cs typeface="+mn-cs"/>
+            </a:endParaRPr>
+          </a:p>
+          <a:p>
+            <a:endParaRPr lang="en-US" sz="3200" kern="1200" dirty="0">
+              <a:solidFill>
+                <a:schemeClr val="tx1"/>
+              </a:solidFill>
+              <a:latin typeface="+mn-lt"/>
+              <a:ea typeface="+mn-ea"/>
+              <a:cs typeface="+mn-cs"/>
+            </a:endParaRPr>
           </a:p>
         </p:txBody>
       </p:sp>
@@ -13848,6 +14056,500 @@
 </file>
 
 <file path=ppt/slides/slide14.xml><?xml version="1.0" encoding="utf-8"?>
+<p:sld xmlns:a="http://schemas.openxmlformats.org/drawingml/2006/main" xmlns:r="http://schemas.openxmlformats.org/officeDocument/2006/relationships" xmlns:p="http://schemas.openxmlformats.org/presentationml/2006/main">
+  <p:cSld>
+    <p:bg>
+      <p:bgPr>
+        <a:solidFill>
+          <a:schemeClr val="bg1"/>
+        </a:solidFill>
+        <a:effectLst/>
+      </p:bgPr>
+    </p:bg>
+    <p:spTree>
+      <p:nvGrpSpPr>
+        <p:cNvPr id="1" name=""/>
+        <p:cNvGrpSpPr/>
+        <p:nvPr/>
+      </p:nvGrpSpPr>
+      <p:grpSpPr>
+        <a:xfrm>
+          <a:off x="0" y="0"/>
+          <a:ext cx="0" cy="0"/>
+          <a:chOff x="0" y="0"/>
+          <a:chExt cx="0" cy="0"/>
+        </a:xfrm>
+      </p:grpSpPr>
+      <p:sp useBgFill="1">
+        <p:nvSpPr>
+          <p:cNvPr id="8" name="Rectangle 7">
+            <a:extLst>
+              <a:ext uri="{FF2B5EF4-FFF2-40B4-BE49-F238E27FC236}">
+                <a16:creationId xmlns:a16="http://schemas.microsoft.com/office/drawing/2014/main" id="{C7FA33FF-088D-4F16-95A2-2C64D353DEA8}"/>
+              </a:ext>
+              <a:ext uri="{C183D7F6-B498-43B3-948B-1728B52AA6E4}">
+                <adec:decorative xmlns:adec="http://schemas.microsoft.com/office/drawing/2017/decorative" val="1"/>
+              </a:ext>
+            </a:extLst>
+          </p:cNvPr>
+          <p:cNvSpPr>
+            <a:spLocks noGrp="1" noRot="1" noChangeAspect="1" noMove="1" noResize="1" noEditPoints="1" noAdjustHandles="1" noChangeArrowheads="1" noChangeShapeType="1" noTextEdit="1"/>
+          </p:cNvSpPr>
+          <p:nvPr>
+            <p:extLst>
+              <p:ext uri="{386F3935-93C4-4BCD-93E2-E3B085C9AB24}">
+                <p16:designElem xmlns:p16="http://schemas.microsoft.com/office/powerpoint/2015/main" val="1"/>
+              </p:ext>
+            </p:extLst>
+          </p:nvPr>
+        </p:nvSpPr>
+        <p:spPr>
+          <a:xfrm>
+            <a:off x="1524" y="0"/>
+            <a:ext cx="12188952" cy="6858000"/>
+          </a:xfrm>
+          <a:prstGeom prst="rect">
+            <a:avLst/>
+          </a:prstGeom>
+          <a:ln>
+            <a:noFill/>
+          </a:ln>
+        </p:spPr>
+        <p:style>
+          <a:lnRef idx="2">
+            <a:schemeClr val="accent1">
+              <a:shade val="50000"/>
+            </a:schemeClr>
+          </a:lnRef>
+          <a:fillRef idx="1">
+            <a:schemeClr val="accent1"/>
+          </a:fillRef>
+          <a:effectRef idx="0">
+            <a:schemeClr val="accent1"/>
+          </a:effectRef>
+          <a:fontRef idx="minor">
+            <a:schemeClr val="lt1"/>
+          </a:fontRef>
+        </p:style>
+        <p:txBody>
+          <a:bodyPr rtlCol="0" anchor="ctr"/>
+          <a:lstStyle/>
+          <a:p>
+            <a:pPr marL="0" marR="0" lvl="0" indent="0" algn="ctr" defTabSz="914400" rtl="0" eaLnBrk="1" fontAlgn="auto" latinLnBrk="0" hangingPunct="1">
+              <a:lnSpc>
+                <a:spcPct val="100000"/>
+              </a:lnSpc>
+              <a:spcBef>
+                <a:spcPts val="0"/>
+              </a:spcBef>
+              <a:spcAft>
+                <a:spcPts val="0"/>
+              </a:spcAft>
+              <a:buClrTx/>
+              <a:buSzTx/>
+              <a:buFontTx/>
+              <a:buNone/>
+              <a:tabLst/>
+              <a:defRPr/>
+            </a:pPr>
+            <a:endParaRPr kumimoji="0" lang="en-US" sz="1800" b="0" i="0" u="none" strike="noStrike" kern="1200" cap="none" spc="0" normalizeH="0" baseline="0" noProof="0">
+              <a:ln>
+                <a:noFill/>
+              </a:ln>
+              <a:solidFill>
+                <a:prstClr val="white"/>
+              </a:solidFill>
+              <a:effectLst/>
+              <a:uLnTx/>
+              <a:uFillTx/>
+              <a:latin typeface="Calibri" panose="020F0502020204030204"/>
+              <a:ea typeface="+mn-ea"/>
+              <a:cs typeface="+mn-cs"/>
+            </a:endParaRPr>
+          </a:p>
+        </p:txBody>
+      </p:sp>
+      <p:sp>
+        <p:nvSpPr>
+          <p:cNvPr id="10" name="Rectangle 9">
+            <a:extLst>
+              <a:ext uri="{FF2B5EF4-FFF2-40B4-BE49-F238E27FC236}">
+                <a16:creationId xmlns:a16="http://schemas.microsoft.com/office/drawing/2014/main" id="{A376EFB1-01CF-419F-ABF1-2AF02BBFCBD1}"/>
+              </a:ext>
+              <a:ext uri="{C183D7F6-B498-43B3-948B-1728B52AA6E4}">
+                <adec:decorative xmlns:adec="http://schemas.microsoft.com/office/drawing/2017/decorative" val="1"/>
+              </a:ext>
+            </a:extLst>
+          </p:cNvPr>
+          <p:cNvSpPr>
+            <a:spLocks noGrp="1" noRot="1" noChangeAspect="1" noMove="1" noResize="1" noEditPoints="1" noAdjustHandles="1" noChangeArrowheads="1" noChangeShapeType="1" noTextEdit="1"/>
+          </p:cNvSpPr>
+          <p:nvPr>
+            <p:extLst>
+              <p:ext uri="{386F3935-93C4-4BCD-93E2-E3B085C9AB24}">
+                <p16:designElem xmlns:p16="http://schemas.microsoft.com/office/powerpoint/2015/main" val="1"/>
+              </p:ext>
+            </p:extLst>
+          </p:nvPr>
+        </p:nvSpPr>
+        <p:spPr>
+          <a:xfrm>
+            <a:off x="0" y="0"/>
+            <a:ext cx="4709160" cy="6858000"/>
+          </a:xfrm>
+          <a:prstGeom prst="rect">
+            <a:avLst/>
+          </a:prstGeom>
+          <a:solidFill>
+            <a:schemeClr val="tx1">
+              <a:alpha val="81000"/>
+            </a:schemeClr>
+          </a:solidFill>
+          <a:ln>
+            <a:noFill/>
+          </a:ln>
+        </p:spPr>
+        <p:style>
+          <a:lnRef idx="2">
+            <a:schemeClr val="accent1">
+              <a:shade val="50000"/>
+            </a:schemeClr>
+          </a:lnRef>
+          <a:fillRef idx="1">
+            <a:schemeClr val="accent1"/>
+          </a:fillRef>
+          <a:effectRef idx="0">
+            <a:schemeClr val="accent1"/>
+          </a:effectRef>
+          <a:fontRef idx="minor">
+            <a:schemeClr val="lt1"/>
+          </a:fontRef>
+        </p:style>
+        <p:txBody>
+          <a:bodyPr rtlCol="0" anchor="ctr"/>
+          <a:lstStyle/>
+          <a:p>
+            <a:pPr marL="0" marR="0" lvl="0" indent="0" algn="ctr" defTabSz="914400" rtl="0" eaLnBrk="1" fontAlgn="auto" latinLnBrk="0" hangingPunct="1">
+              <a:lnSpc>
+                <a:spcPct val="100000"/>
+              </a:lnSpc>
+              <a:spcBef>
+                <a:spcPts val="0"/>
+              </a:spcBef>
+              <a:spcAft>
+                <a:spcPts val="0"/>
+              </a:spcAft>
+              <a:buClrTx/>
+              <a:buSzTx/>
+              <a:buFontTx/>
+              <a:buNone/>
+              <a:tabLst/>
+              <a:defRPr/>
+            </a:pPr>
+            <a:endParaRPr kumimoji="0" lang="en-US" sz="1800" b="0" i="0" u="none" strike="noStrike" kern="1200" cap="none" spc="0" normalizeH="0" baseline="0" noProof="0">
+              <a:ln>
+                <a:noFill/>
+              </a:ln>
+              <a:solidFill>
+                <a:prstClr val="white"/>
+              </a:solidFill>
+              <a:effectLst/>
+              <a:uLnTx/>
+              <a:uFillTx/>
+              <a:latin typeface="Calibri" panose="020F0502020204030204"/>
+              <a:ea typeface="+mn-ea"/>
+              <a:cs typeface="+mn-cs"/>
+            </a:endParaRPr>
+          </a:p>
+        </p:txBody>
+      </p:sp>
+      <p:sp>
+        <p:nvSpPr>
+          <p:cNvPr id="12" name="Freeform: Shape 11">
+            <a:extLst>
+              <a:ext uri="{FF2B5EF4-FFF2-40B4-BE49-F238E27FC236}">
+                <a16:creationId xmlns:a16="http://schemas.microsoft.com/office/drawing/2014/main" id="{FF9DEA15-78BD-4750-AA18-B9F28A6D5AB8}"/>
+              </a:ext>
+              <a:ext uri="{C183D7F6-B498-43B3-948B-1728B52AA6E4}">
+                <adec:decorative xmlns:adec="http://schemas.microsoft.com/office/drawing/2017/decorative" val="1"/>
+              </a:ext>
+            </a:extLst>
+          </p:cNvPr>
+          <p:cNvSpPr>
+            <a:spLocks noGrp="1" noRot="1" noChangeAspect="1" noMove="1" noResize="1" noEditPoints="1" noAdjustHandles="1" noChangeArrowheads="1" noChangeShapeType="1" noTextEdit="1"/>
+          </p:cNvSpPr>
+          <p:nvPr>
+            <p:extLst>
+              <p:ext uri="{386F3935-93C4-4BCD-93E2-E3B085C9AB24}">
+                <p16:designElem xmlns:p16="http://schemas.microsoft.com/office/powerpoint/2015/main" val="1"/>
+              </p:ext>
+            </p:extLst>
+          </p:nvPr>
+        </p:nvSpPr>
+        <p:spPr>
+          <a:xfrm>
+            <a:off x="0" y="0"/>
+            <a:ext cx="3284331" cy="6858000"/>
+          </a:xfrm>
+          <a:custGeom>
+            <a:avLst/>
+            <a:gdLst>
+              <a:gd name="connsiteX0" fmla="*/ 0 w 4319042"/>
+              <a:gd name="connsiteY0" fmla="*/ 0 h 6858000"/>
+              <a:gd name="connsiteX1" fmla="*/ 1142888 w 4319042"/>
+              <a:gd name="connsiteY1" fmla="*/ 0 h 6858000"/>
+              <a:gd name="connsiteX2" fmla="*/ 4319042 w 4319042"/>
+              <a:gd name="connsiteY2" fmla="*/ 6858000 h 6858000"/>
+              <a:gd name="connsiteX3" fmla="*/ 0 w 4319042"/>
+              <a:gd name="connsiteY3" fmla="*/ 6858000 h 6858000"/>
+            </a:gdLst>
+            <a:ahLst/>
+            <a:cxnLst>
+              <a:cxn ang="0">
+                <a:pos x="connsiteX0" y="connsiteY0"/>
+              </a:cxn>
+              <a:cxn ang="0">
+                <a:pos x="connsiteX1" y="connsiteY1"/>
+              </a:cxn>
+              <a:cxn ang="0">
+                <a:pos x="connsiteX2" y="connsiteY2"/>
+              </a:cxn>
+              <a:cxn ang="0">
+                <a:pos x="connsiteX3" y="connsiteY3"/>
+              </a:cxn>
+            </a:cxnLst>
+            <a:rect l="l" t="t" r="r" b="b"/>
+            <a:pathLst>
+              <a:path w="4319042" h="6858000">
+                <a:moveTo>
+                  <a:pt x="0" y="0"/>
+                </a:moveTo>
+                <a:lnTo>
+                  <a:pt x="1142888" y="0"/>
+                </a:lnTo>
+                <a:lnTo>
+                  <a:pt x="4319042" y="6858000"/>
+                </a:lnTo>
+                <a:lnTo>
+                  <a:pt x="0" y="6858000"/>
+                </a:lnTo>
+                <a:close/>
+              </a:path>
+            </a:pathLst>
+          </a:custGeom>
+          <a:solidFill>
+            <a:schemeClr val="tx1">
+              <a:alpha val="35000"/>
+            </a:schemeClr>
+          </a:solidFill>
+          <a:ln>
+            <a:noFill/>
+          </a:ln>
+        </p:spPr>
+        <p:style>
+          <a:lnRef idx="2">
+            <a:schemeClr val="accent1">
+              <a:shade val="50000"/>
+            </a:schemeClr>
+          </a:lnRef>
+          <a:fillRef idx="1">
+            <a:schemeClr val="accent1"/>
+          </a:fillRef>
+          <a:effectRef idx="0">
+            <a:schemeClr val="accent1"/>
+          </a:effectRef>
+          <a:fontRef idx="minor">
+            <a:schemeClr val="lt1"/>
+          </a:fontRef>
+        </p:style>
+        <p:txBody>
+          <a:bodyPr wrap="square" rtlCol="0" anchor="ctr">
+            <a:noAutofit/>
+          </a:bodyPr>
+          <a:lstStyle/>
+          <a:p>
+            <a:pPr marL="0" marR="0" lvl="0" indent="0" algn="ctr" defTabSz="914400" rtl="0" eaLnBrk="1" fontAlgn="auto" latinLnBrk="0" hangingPunct="1">
+              <a:lnSpc>
+                <a:spcPct val="100000"/>
+              </a:lnSpc>
+              <a:spcBef>
+                <a:spcPts val="0"/>
+              </a:spcBef>
+              <a:spcAft>
+                <a:spcPts val="0"/>
+              </a:spcAft>
+              <a:buClrTx/>
+              <a:buSzTx/>
+              <a:buFontTx/>
+              <a:buNone/>
+              <a:tabLst/>
+              <a:defRPr/>
+            </a:pPr>
+            <a:endParaRPr kumimoji="0" lang="en-US" sz="1800" b="0" i="0" u="none" strike="noStrike" kern="1200" cap="none" spc="0" normalizeH="0" baseline="0" noProof="0">
+              <a:ln>
+                <a:noFill/>
+              </a:ln>
+              <a:solidFill>
+                <a:prstClr val="white"/>
+              </a:solidFill>
+              <a:effectLst/>
+              <a:uLnTx/>
+              <a:uFillTx/>
+              <a:latin typeface="Calibri" panose="020F0502020204030204"/>
+              <a:ea typeface="+mn-ea"/>
+              <a:cs typeface="+mn-cs"/>
+            </a:endParaRPr>
+          </a:p>
+        </p:txBody>
+      </p:sp>
+      <p:sp>
+        <p:nvSpPr>
+          <p:cNvPr id="2" name="Title 1">
+            <a:extLst>
+              <a:ext uri="{FF2B5EF4-FFF2-40B4-BE49-F238E27FC236}">
+                <a16:creationId xmlns:a16="http://schemas.microsoft.com/office/drawing/2014/main" id="{72435E97-8E7A-4036-B16A-B49EF49B3DA6}"/>
+              </a:ext>
+            </a:extLst>
+          </p:cNvPr>
+          <p:cNvSpPr>
+            <a:spLocks noGrp="1"/>
+          </p:cNvSpPr>
+          <p:nvPr>
+            <p:ph type="title"/>
+          </p:nvPr>
+        </p:nvSpPr>
+        <p:spPr>
+          <a:xfrm>
+            <a:off x="804672" y="640080"/>
+            <a:ext cx="3282696" cy="5257800"/>
+          </a:xfrm>
+        </p:spPr>
+        <p:txBody>
+          <a:bodyPr>
+            <a:normAutofit/>
+          </a:bodyPr>
+          <a:lstStyle/>
+          <a:p>
+            <a:r>
+              <a:rPr lang="en-US" dirty="0">
+                <a:solidFill>
+                  <a:schemeClr val="bg1"/>
+                </a:solidFill>
+              </a:rPr>
+              <a:t>Naive Bayes </a:t>
+            </a:r>
+            <a:br>
+              <a:rPr lang="en-US" dirty="0">
+                <a:solidFill>
+                  <a:schemeClr val="bg1"/>
+                </a:solidFill>
+              </a:rPr>
+            </a:br>
+            <a:r>
+              <a:rPr lang="en-US" dirty="0">
+                <a:solidFill>
+                  <a:schemeClr val="bg1"/>
+                </a:solidFill>
+              </a:rPr>
+              <a:t>Algorithms</a:t>
+            </a:r>
+          </a:p>
+        </p:txBody>
+      </p:sp>
+      <p:sp>
+        <p:nvSpPr>
+          <p:cNvPr id="3" name="Content Placeholder 2">
+            <a:extLst>
+              <a:ext uri="{FF2B5EF4-FFF2-40B4-BE49-F238E27FC236}">
+                <a16:creationId xmlns:a16="http://schemas.microsoft.com/office/drawing/2014/main" id="{5BF9433E-798E-4A53-8B50-D157D7563D26}"/>
+              </a:ext>
+            </a:extLst>
+          </p:cNvPr>
+          <p:cNvSpPr>
+            <a:spLocks noGrp="1"/>
+          </p:cNvSpPr>
+          <p:nvPr>
+            <p:ph idx="1"/>
+          </p:nvPr>
+        </p:nvSpPr>
+        <p:spPr>
+          <a:xfrm>
+            <a:off x="5358384" y="640081"/>
+            <a:ext cx="6024654" cy="5257800"/>
+          </a:xfrm>
+        </p:spPr>
+        <p:txBody>
+          <a:bodyPr anchor="ctr">
+            <a:normAutofit/>
+          </a:bodyPr>
+          <a:lstStyle/>
+          <a:p>
+            <a:pPr marL="0" indent="0">
+              <a:buNone/>
+            </a:pPr>
+            <a:r>
+              <a:rPr lang="en-US" sz="1700" b="1" dirty="0"/>
+              <a:t>Bernoulli Naive Bayes </a:t>
+            </a:r>
+            <a:r>
+              <a:rPr lang="en-US" sz="1700" dirty="0"/>
+              <a:t>: It assumes that all our features are binary such that they take only two values. Means 0s can represent “word does not occur in the document” and 1s as "word occurs in the document" .</a:t>
+            </a:r>
+          </a:p>
+          <a:p>
+            <a:pPr marL="0" indent="0">
+              <a:buNone/>
+            </a:pPr>
+            <a:endParaRPr lang="en-US" sz="1700" dirty="0"/>
+          </a:p>
+          <a:p>
+            <a:pPr marL="0" indent="0">
+              <a:buNone/>
+            </a:pPr>
+            <a:r>
+              <a:rPr lang="en-US" sz="1700" b="1" dirty="0"/>
+              <a:t>Multinomial Naive Bayes </a:t>
+            </a:r>
+            <a:r>
+              <a:rPr lang="en-US" sz="1700" dirty="0"/>
+              <a:t>: Its is used when we have discrete data (e.g. movie ratings ranging 1 and 5 as each rating will have certain frequency to represent). In text learning we have the count of each word to predict the class or label.</a:t>
+            </a:r>
+          </a:p>
+          <a:p>
+            <a:pPr marL="0" indent="0">
+              <a:buNone/>
+            </a:pPr>
+            <a:endParaRPr lang="en-US" sz="1700" dirty="0"/>
+          </a:p>
+          <a:p>
+            <a:pPr marL="0" indent="0">
+              <a:buNone/>
+            </a:pPr>
+            <a:r>
+              <a:rPr lang="en-US" sz="1700" b="1" dirty="0"/>
+              <a:t>Gaussian Naive Bayes </a:t>
+            </a:r>
+            <a:r>
+              <a:rPr lang="en-US" sz="1700" dirty="0"/>
+              <a:t>: Because of the assumption of the normal distribution, Gaussian Naive Bayes is used in cases when all our features are continuous. For example, in Iris dataset features are sepal width, petal width, sepal length, petal length. So, its features can have different values in data set as width and length can vary. We can’t represent features in terms of their occurrences. This means data is continuous. Hence, we use Gaussian Naive Bayes here.</a:t>
+            </a:r>
+          </a:p>
+        </p:txBody>
+      </p:sp>
+    </p:spTree>
+    <p:extLst>
+      <p:ext uri="{BB962C8B-B14F-4D97-AF65-F5344CB8AC3E}">
+        <p14:creationId xmlns:p14="http://schemas.microsoft.com/office/powerpoint/2010/main" val="931110860"/>
+      </p:ext>
+    </p:extLst>
+  </p:cSld>
+  <p:clrMapOvr>
+    <a:masterClrMapping/>
+  </p:clrMapOvr>
+</p:sld>
+</file>
+
+<file path=ppt/slides/slide15.xml><?xml version="1.0" encoding="utf-8"?>
 <p:sld xmlns:a="http://schemas.openxmlformats.org/drawingml/2006/main" xmlns:r="http://schemas.openxmlformats.org/officeDocument/2006/relationships" xmlns:p="http://schemas.openxmlformats.org/presentationml/2006/main">
   <p:cSld>
     <p:bg>

</xml_diff>